<commit_message>
fight & defends functions debugged
</commit_message>
<xml_diff>
--- a/Projet 6.pptx
+++ b/Projet 6.pptx
@@ -107,6 +107,11 @@
       </a:defRPr>
     </a:lvl9pPr>
   </p:defaultTextStyle>
+  <p:extLst>
+    <p:ext uri="{EFAFB233-063F-42B5-8137-9DF3F51BA10A}">
+      <p15:sldGuideLst xmlns:p15="http://schemas.microsoft.com/office/powerpoint/2012/main"/>
+    </p:ext>
+  </p:extLst>
 </p:presentation>
 </file>
 
@@ -296,7 +301,7 @@
           <a:p>
             <a:fld id="{4AAD347D-5ACD-4C99-B74B-A9C85AD731AF}" type="datetimeFigureOut">
               <a:rPr lang="en-US" dirty="0"/>
-              <a:t>2/5/2019</a:t>
+              <a:t>2/6/2019</a:t>
             </a:fld>
             <a:endParaRPr lang="en-US" dirty="0"/>
           </a:p>
@@ -566,7 +571,7 @@
           <a:p>
             <a:fld id="{4509A250-FF31-4206-8172-F9D3106AACB1}" type="datetimeFigureOut">
               <a:rPr lang="en-US" dirty="0"/>
-              <a:t>2/5/2019</a:t>
+              <a:t>2/6/2019</a:t>
             </a:fld>
             <a:endParaRPr lang="en-US" dirty="0"/>
           </a:p>
@@ -755,7 +760,7 @@
           <a:p>
             <a:fld id="{4509A250-FF31-4206-8172-F9D3106AACB1}" type="datetimeFigureOut">
               <a:rPr lang="en-US" dirty="0"/>
-              <a:t>2/5/2019</a:t>
+              <a:t>2/6/2019</a:t>
             </a:fld>
             <a:endParaRPr lang="en-US" dirty="0"/>
           </a:p>
@@ -1023,7 +1028,7 @@
           <a:p>
             <a:fld id="{4509A250-FF31-4206-8172-F9D3106AACB1}" type="datetimeFigureOut">
               <a:rPr lang="en-US" dirty="0"/>
-              <a:t>2/5/2019</a:t>
+              <a:t>2/6/2019</a:t>
             </a:fld>
             <a:endParaRPr lang="en-US" dirty="0"/>
           </a:p>
@@ -1359,7 +1364,7 @@
           <a:p>
             <a:fld id="{4509A250-FF31-4206-8172-F9D3106AACB1}" type="datetimeFigureOut">
               <a:rPr lang="en-US" dirty="0"/>
-              <a:t>2/5/2019</a:t>
+              <a:t>2/6/2019</a:t>
             </a:fld>
             <a:endParaRPr lang="en-US" dirty="0"/>
           </a:p>
@@ -1977,7 +1982,7 @@
           <a:p>
             <a:fld id="{4509A250-FF31-4206-8172-F9D3106AACB1}" type="datetimeFigureOut">
               <a:rPr lang="en-US" dirty="0"/>
-              <a:t>2/5/2019</a:t>
+              <a:t>2/6/2019</a:t>
             </a:fld>
             <a:endParaRPr lang="en-US" dirty="0"/>
           </a:p>
@@ -2832,7 +2837,7 @@
           <a:p>
             <a:fld id="{4509A250-FF31-4206-8172-F9D3106AACB1}" type="datetimeFigureOut">
               <a:rPr lang="en-US" dirty="0"/>
-              <a:t>2/5/2019</a:t>
+              <a:t>2/6/2019</a:t>
             </a:fld>
             <a:endParaRPr lang="en-US" dirty="0"/>
           </a:p>
@@ -2997,7 +3002,7 @@
           <a:p>
             <a:fld id="{4509A250-FF31-4206-8172-F9D3106AACB1}" type="datetimeFigureOut">
               <a:rPr lang="en-US" dirty="0"/>
-              <a:t>2/5/2019</a:t>
+              <a:t>2/6/2019</a:t>
             </a:fld>
             <a:endParaRPr lang="en-US" dirty="0"/>
           </a:p>
@@ -3172,7 +3177,7 @@
           <a:p>
             <a:fld id="{4509A250-FF31-4206-8172-F9D3106AACB1}" type="datetimeFigureOut">
               <a:rPr lang="en-US" dirty="0"/>
-              <a:t>2/5/2019</a:t>
+              <a:t>2/6/2019</a:t>
             </a:fld>
             <a:endParaRPr lang="en-US" dirty="0"/>
           </a:p>
@@ -3337,7 +3342,7 @@
           <a:p>
             <a:fld id="{4509A250-FF31-4206-8172-F9D3106AACB1}" type="datetimeFigureOut">
               <a:rPr lang="en-US" dirty="0"/>
-              <a:t>2/5/2019</a:t>
+              <a:t>2/6/2019</a:t>
             </a:fld>
             <a:endParaRPr lang="en-US" dirty="0"/>
           </a:p>
@@ -3579,7 +3584,7 @@
           <a:p>
             <a:fld id="{9796027F-7875-4030-9381-8BD8C4F21935}" type="datetimeFigureOut">
               <a:rPr lang="en-US" dirty="0"/>
-              <a:t>2/5/2019</a:t>
+              <a:t>2/6/2019</a:t>
             </a:fld>
             <a:endParaRPr lang="en-US" dirty="0"/>
           </a:p>
@@ -3866,7 +3871,7 @@
           <a:p>
             <a:fld id="{9796027F-7875-4030-9381-8BD8C4F21935}" type="datetimeFigureOut">
               <a:rPr lang="en-US" dirty="0"/>
-              <a:t>2/5/2019</a:t>
+              <a:t>2/6/2019</a:t>
             </a:fld>
             <a:endParaRPr lang="en-US" dirty="0"/>
           </a:p>
@@ -4305,7 +4310,7 @@
           <a:p>
             <a:fld id="{9796027F-7875-4030-9381-8BD8C4F21935}" type="datetimeFigureOut">
               <a:rPr lang="en-US" dirty="0"/>
-              <a:t>2/5/2019</a:t>
+              <a:t>2/6/2019</a:t>
             </a:fld>
             <a:endParaRPr lang="en-US" dirty="0"/>
           </a:p>
@@ -4418,7 +4423,7 @@
           <a:p>
             <a:fld id="{4509A250-FF31-4206-8172-F9D3106AACB1}" type="datetimeFigureOut">
               <a:rPr lang="en-US" dirty="0"/>
-              <a:t>2/5/2019</a:t>
+              <a:t>2/6/2019</a:t>
             </a:fld>
             <a:endParaRPr lang="en-US" dirty="0"/>
           </a:p>
@@ -4508,7 +4513,7 @@
           <a:p>
             <a:fld id="{4509A250-FF31-4206-8172-F9D3106AACB1}" type="datetimeFigureOut">
               <a:rPr lang="en-US" dirty="0"/>
-              <a:t>2/5/2019</a:t>
+              <a:t>2/6/2019</a:t>
             </a:fld>
             <a:endParaRPr lang="en-US" dirty="0"/>
           </a:p>
@@ -4782,7 +4787,7 @@
           <a:p>
             <a:fld id="{4509A250-FF31-4206-8172-F9D3106AACB1}" type="datetimeFigureOut">
               <a:rPr lang="en-US" dirty="0"/>
-              <a:t>2/5/2019</a:t>
+              <a:t>2/6/2019</a:t>
             </a:fld>
             <a:endParaRPr lang="en-US" dirty="0"/>
           </a:p>
@@ -5052,7 +5057,7 @@
           <a:p>
             <a:fld id="{4509A250-FF31-4206-8172-F9D3106AACB1}" type="datetimeFigureOut">
               <a:rPr lang="en-US" dirty="0"/>
-              <a:t>2/5/2019</a:t>
+              <a:t>2/6/2019</a:t>
             </a:fld>
             <a:endParaRPr lang="en-US" dirty="0"/>
           </a:p>
@@ -5476,7 +5481,7 @@
           <a:p>
             <a:fld id="{4AAD347D-5ACD-4C99-B74B-A9C85AD731AF}" type="datetimeFigureOut">
               <a:rPr lang="en-US" dirty="0"/>
-              <a:t>2/5/2019</a:t>
+              <a:t>2/6/2019</a:t>
             </a:fld>
             <a:endParaRPr lang="en-US" dirty="0"/>
           </a:p>
@@ -6241,9 +6246,26 @@
   <p:cSld>
     <p:bg>
       <p:bgPr>
-        <a:solidFill>
-          <a:schemeClr val="bg1"/>
-        </a:solidFill>
+        <a:blipFill rotWithShape="1">
+          <a:blip r:embed="rId2">
+            <a:duotone>
+              <a:schemeClr val="bg2">
+                <a:shade val="69000"/>
+                <a:hueMod val="108000"/>
+                <a:satMod val="164000"/>
+                <a:lumMod val="74000"/>
+              </a:schemeClr>
+              <a:schemeClr val="bg2">
+                <a:tint val="96000"/>
+                <a:hueMod val="88000"/>
+                <a:satMod val="140000"/>
+                <a:lumMod val="132000"/>
+              </a:schemeClr>
+            </a:duotone>
+            <a:extLst/>
+          </a:blip>
+          <a:stretch/>
+        </a:blipFill>
         <a:effectLst/>
       </p:bgPr>
     </p:bg>
@@ -6263,7 +6285,7 @@
       </p:grpSpPr>
       <p:pic>
         <p:nvPicPr>
-          <p:cNvPr id="10" name="Picture 9">
+          <p:cNvPr id="22" name="Picture 21">
             <a:extLst>
               <a:ext uri="{FF2B5EF4-FFF2-40B4-BE49-F238E27FC236}">
                 <a16:creationId xmlns:a16="http://schemas.microsoft.com/office/drawing/2014/main" id="{41B68C77-138E-4BF7-A276-BD0C78A4219F}"/>
@@ -6285,7 +6307,7 @@
           </p:nvPr>
         </p:nvPicPr>
         <p:blipFill rotWithShape="1">
-          <a:blip r:embed="rId2">
+          <a:blip r:embed="rId3">
             <a:extLst>
               <a:ext uri="{28A0092B-C50C-407E-A947-70E740481C1C}">
                 <a14:useLocalDpi xmlns:a14="http://schemas.microsoft.com/office/drawing/2010/main" val="0"/>
@@ -6307,7 +6329,7 @@
       </p:pic>
       <p:pic>
         <p:nvPicPr>
-          <p:cNvPr id="12" name="Picture 11">
+          <p:cNvPr id="24" name="Picture 23">
             <a:extLst>
               <a:ext uri="{FF2B5EF4-FFF2-40B4-BE49-F238E27FC236}">
                 <a16:creationId xmlns:a16="http://schemas.microsoft.com/office/drawing/2014/main" id="{7C268552-D473-46ED-B1B8-422042C4DEF1}"/>
@@ -6329,7 +6351,7 @@
           </p:nvPr>
         </p:nvPicPr>
         <p:blipFill rotWithShape="1">
-          <a:blip r:embed="rId3">
+          <a:blip r:embed="rId4">
             <a:extLst>
               <a:ext uri="{28A0092B-C50C-407E-A947-70E740481C1C}">
                 <a14:useLocalDpi xmlns:a14="http://schemas.microsoft.com/office/drawing/2010/main" val="0"/>
@@ -6351,7 +6373,7 @@
       </p:pic>
       <p:sp>
         <p:nvSpPr>
-          <p:cNvPr id="14" name="Oval 13">
+          <p:cNvPr id="26" name="Oval 25">
             <a:extLst>
               <a:ext uri="{FF2B5EF4-FFF2-40B4-BE49-F238E27FC236}">
                 <a16:creationId xmlns:a16="http://schemas.microsoft.com/office/drawing/2014/main" id="{4AC0CD9D-7610-4620-93B4-798CCD9AB581}"/>
@@ -6431,7 +6453,7 @@
       </p:sp>
       <p:pic>
         <p:nvPicPr>
-          <p:cNvPr id="16" name="Picture 15">
+          <p:cNvPr id="28" name="Picture 27">
             <a:extLst>
               <a:ext uri="{FF2B5EF4-FFF2-40B4-BE49-F238E27FC236}">
                 <a16:creationId xmlns:a16="http://schemas.microsoft.com/office/drawing/2014/main" id="{B9238B3E-24AA-439A-B527-6C5DF6D72145}"/>
@@ -6453,7 +6475,7 @@
           </p:nvPr>
         </p:nvPicPr>
         <p:blipFill rotWithShape="1">
-          <a:blip r:embed="rId4">
+          <a:blip r:embed="rId5">
             <a:extLst>
               <a:ext uri="{28A0092B-C50C-407E-A947-70E740481C1C}">
                 <a14:useLocalDpi xmlns:a14="http://schemas.microsoft.com/office/drawing/2010/main" val="0"/>
@@ -6475,7 +6497,7 @@
       </p:pic>
       <p:pic>
         <p:nvPicPr>
-          <p:cNvPr id="18" name="Picture 17">
+          <p:cNvPr id="30" name="Picture 29">
             <a:extLst>
               <a:ext uri="{FF2B5EF4-FFF2-40B4-BE49-F238E27FC236}">
                 <a16:creationId xmlns:a16="http://schemas.microsoft.com/office/drawing/2014/main" id="{69F01145-BEA3-4CBF-AA21-10077B948CA8}"/>
@@ -6497,7 +6519,7 @@
           </p:nvPr>
         </p:nvPicPr>
         <p:blipFill rotWithShape="1">
-          <a:blip r:embed="rId5">
+          <a:blip r:embed="rId6">
             <a:extLst>
               <a:ext uri="{28A0092B-C50C-407E-A947-70E740481C1C}">
                 <a14:useLocalDpi xmlns:a14="http://schemas.microsoft.com/office/drawing/2010/main" val="0"/>
@@ -6519,7 +6541,7 @@
       </p:pic>
       <p:sp>
         <p:nvSpPr>
-          <p:cNvPr id="20" name="Rectangle 19">
+          <p:cNvPr id="32" name="Rectangle 31">
             <a:extLst>
               <a:ext uri="{FF2B5EF4-FFF2-40B4-BE49-F238E27FC236}">
                 <a16:creationId xmlns:a16="http://schemas.microsoft.com/office/drawing/2014/main" id="{DE4D62F9-188E-4530-84C2-24BDEE4BEB82}"/>
@@ -6572,66 +6594,6 @@
       </p:sp>
       <p:sp>
         <p:nvSpPr>
-          <p:cNvPr id="22" name="Rectangle 21">
-            <a:extLst>
-              <a:ext uri="{FF2B5EF4-FFF2-40B4-BE49-F238E27FC236}">
-                <a16:creationId xmlns:a16="http://schemas.microsoft.com/office/drawing/2014/main" id="{757B325C-3E35-45CF-9D07-3BCB281F3B9C}"/>
-              </a:ext>
-              <a:ext uri="{C183D7F6-B498-43B3-948B-1728B52AA6E4}">
-                <adec:decorative xmlns:adec="http://schemas.microsoft.com/office/drawing/2017/decorative" val="1"/>
-              </a:ext>
-            </a:extLst>
-          </p:cNvPr>
-          <p:cNvSpPr>
-            <a:spLocks noGrp="1" noRot="1" noChangeAspect="1" noMove="1" noResize="1" noEditPoints="1" noAdjustHandles="1" noChangeArrowheads="1" noChangeShapeType="1" noTextEdit="1"/>
-          </p:cNvSpPr>
-          <p:nvPr>
-            <p:extLst>
-              <p:ext uri="{386F3935-93C4-4BCD-93E2-E3B085C9AB24}">
-                <p16:designElem xmlns:p16="http://schemas.microsoft.com/office/powerpoint/2015/main" val="1"/>
-              </p:ext>
-            </p:extLst>
-          </p:nvPr>
-        </p:nvSpPr>
-        <p:spPr>
-          <a:xfrm>
-            <a:off x="0" y="0"/>
-            <a:ext cx="12192000" cy="6858000"/>
-          </a:xfrm>
-          <a:prstGeom prst="rect">
-            <a:avLst/>
-          </a:prstGeom>
-          <a:ln>
-            <a:noFill/>
-          </a:ln>
-        </p:spPr>
-        <p:style>
-          <a:lnRef idx="2">
-            <a:schemeClr val="accent1">
-              <a:shade val="50000"/>
-            </a:schemeClr>
-          </a:lnRef>
-          <a:fillRef idx="1003">
-            <a:schemeClr val="dk2"/>
-          </a:fillRef>
-          <a:effectRef idx="0">
-            <a:schemeClr val="accent1"/>
-          </a:effectRef>
-          <a:fontRef idx="minor">
-            <a:schemeClr val="lt1"/>
-          </a:fontRef>
-        </p:style>
-        <p:txBody>
-          <a:bodyPr rtlCol="0" anchor="ctr"/>
-          <a:lstStyle/>
-          <a:p>
-            <a:pPr algn="ctr"/>
-            <a:endParaRPr lang="en-US"/>
-          </a:p>
-        </p:txBody>
-      </p:sp>
-      <p:sp>
-        <p:nvSpPr>
           <p:cNvPr id="2" name="Titre 1">
             <a:extLst>
               <a:ext uri="{FF2B5EF4-FFF2-40B4-BE49-F238E27FC236}">
@@ -6648,8 +6610,8 @@
         </p:nvSpPr>
         <p:spPr>
           <a:xfrm>
-            <a:off x="8191925" y="1325880"/>
-            <a:ext cx="3352375" cy="3066507"/>
+            <a:off x="6683829" y="1447800"/>
+            <a:ext cx="4397828" cy="3329581"/>
           </a:xfrm>
         </p:spPr>
         <p:txBody>
@@ -6659,9 +6621,9 @@
           <a:lstStyle/>
           <a:p>
             <a:r>
-              <a:rPr lang="en-US" sz="5400" b="0" i="0" kern="1200">
+              <a:rPr lang="en-US" sz="6000" b="0" i="0" kern="1200">
                 <a:solidFill>
-                  <a:srgbClr val="EBEBEB"/>
+                  <a:schemeClr val="tx2"/>
                 </a:solidFill>
                 <a:latin typeface="+mj-lt"/>
                 <a:ea typeface="+mj-ea"/>
@@ -6672,906 +6634,12 @@
           </a:p>
         </p:txBody>
       </p:sp>
-      <p:sp>
-        <p:nvSpPr>
-          <p:cNvPr id="24" name="Freeform 36">
+      <p:pic>
+        <p:nvPicPr>
+          <p:cNvPr id="17" name="Espace réservé du contenu 16">
             <a:extLst>
               <a:ext uri="{FF2B5EF4-FFF2-40B4-BE49-F238E27FC236}">
-                <a16:creationId xmlns:a16="http://schemas.microsoft.com/office/drawing/2014/main" id="{C24BEC42-AFF3-40D1-93A2-A27A42E1E23C}"/>
-              </a:ext>
-              <a:ext uri="{C183D7F6-B498-43B3-948B-1728B52AA6E4}">
-                <adec:decorative xmlns:adec="http://schemas.microsoft.com/office/drawing/2017/decorative" val="1"/>
-              </a:ext>
-            </a:extLst>
-          </p:cNvPr>
-          <p:cNvSpPr>
-            <a:spLocks noGrp="1" noRot="1" noChangeAspect="1" noMove="1" noResize="1" noEditPoints="1" noAdjustHandles="1" noChangeArrowheads="1" noChangeShapeType="1" noTextEdit="1"/>
-          </p:cNvSpPr>
-          <p:nvPr>
-            <p:extLst>
-              <p:ext uri="{386F3935-93C4-4BCD-93E2-E3B085C9AB24}">
-                <p16:designElem xmlns:p16="http://schemas.microsoft.com/office/powerpoint/2015/main" val="1"/>
-              </p:ext>
-            </p:extLst>
-          </p:nvPr>
-        </p:nvSpPr>
-        <p:spPr>
-          <a:xfrm flipH="1">
-            <a:off x="7463681" y="-1"/>
-            <a:ext cx="559472" cy="3709642"/>
-          </a:xfrm>
-          <a:custGeom>
-            <a:avLst/>
-            <a:gdLst>
-              <a:gd name="connsiteX0" fmla="*/ 0 w 559472"/>
-              <a:gd name="connsiteY0" fmla="*/ 0 h 3709642"/>
-              <a:gd name="connsiteX1" fmla="*/ 473952 w 559472"/>
-              <a:gd name="connsiteY1" fmla="*/ 0 h 3709642"/>
-              <a:gd name="connsiteX2" fmla="*/ 485840 w 559472"/>
-              <a:gd name="connsiteY2" fmla="*/ 161194 h 3709642"/>
-              <a:gd name="connsiteX3" fmla="*/ 523949 w 559472"/>
-              <a:gd name="connsiteY3" fmla="*/ 3672197 h 3709642"/>
-              <a:gd name="connsiteX4" fmla="*/ 454748 w 559472"/>
-              <a:gd name="connsiteY4" fmla="*/ 3709642 h 3709642"/>
-              <a:gd name="connsiteX5" fmla="*/ 448224 w 559472"/>
-              <a:gd name="connsiteY5" fmla="*/ 3510471 h 3709642"/>
-              <a:gd name="connsiteX6" fmla="*/ 443564 w 559472"/>
-              <a:gd name="connsiteY6" fmla="*/ 3408563 h 3709642"/>
-              <a:gd name="connsiteX7" fmla="*/ 438902 w 559472"/>
-              <a:gd name="connsiteY7" fmla="*/ 3304407 h 3709642"/>
-              <a:gd name="connsiteX8" fmla="*/ 433941 w 559472"/>
-              <a:gd name="connsiteY8" fmla="*/ 3198777 h 3709642"/>
-              <a:gd name="connsiteX9" fmla="*/ 427584 w 559472"/>
-              <a:gd name="connsiteY9" fmla="*/ 3092510 h 3709642"/>
-              <a:gd name="connsiteX10" fmla="*/ 420988 w 559472"/>
-              <a:gd name="connsiteY10" fmla="*/ 2984390 h 3709642"/>
-              <a:gd name="connsiteX11" fmla="*/ 414330 w 559472"/>
-              <a:gd name="connsiteY11" fmla="*/ 2874401 h 3709642"/>
-              <a:gd name="connsiteX12" fmla="*/ 406840 w 559472"/>
-              <a:gd name="connsiteY12" fmla="*/ 2762980 h 3709642"/>
-              <a:gd name="connsiteX13" fmla="*/ 397745 w 559472"/>
-              <a:gd name="connsiteY13" fmla="*/ 2650566 h 3709642"/>
-              <a:gd name="connsiteX14" fmla="*/ 389154 w 559472"/>
-              <a:gd name="connsiteY14" fmla="*/ 2536612 h 3709642"/>
-              <a:gd name="connsiteX15" fmla="*/ 379225 w 559472"/>
-              <a:gd name="connsiteY15" fmla="*/ 2421642 h 3709642"/>
-              <a:gd name="connsiteX16" fmla="*/ 368316 w 559472"/>
-              <a:gd name="connsiteY16" fmla="*/ 2305627 h 3709642"/>
-              <a:gd name="connsiteX17" fmla="*/ 357466 w 559472"/>
-              <a:gd name="connsiteY17" fmla="*/ 2189233 h 3709642"/>
-              <a:gd name="connsiteX18" fmla="*/ 344982 w 559472"/>
-              <a:gd name="connsiteY18" fmla="*/ 2071473 h 3709642"/>
-              <a:gd name="connsiteX19" fmla="*/ 332466 w 559472"/>
-              <a:gd name="connsiteY19" fmla="*/ 1952216 h 3709642"/>
-              <a:gd name="connsiteX20" fmla="*/ 319121 w 559472"/>
-              <a:gd name="connsiteY20" fmla="*/ 1833776 h 3709642"/>
-              <a:gd name="connsiteX21" fmla="*/ 304408 w 559472"/>
-              <a:gd name="connsiteY21" fmla="*/ 1713948 h 3709642"/>
-              <a:gd name="connsiteX22" fmla="*/ 288685 w 559472"/>
-              <a:gd name="connsiteY22" fmla="*/ 1592703 h 3709642"/>
-              <a:gd name="connsiteX23" fmla="*/ 273050 w 559472"/>
-              <a:gd name="connsiteY23" fmla="*/ 1471451 h 3709642"/>
-              <a:gd name="connsiteX24" fmla="*/ 255813 w 559472"/>
-              <a:gd name="connsiteY24" fmla="*/ 1350328 h 3709642"/>
-              <a:gd name="connsiteX25" fmla="*/ 237060 w 559472"/>
-              <a:gd name="connsiteY25" fmla="*/ 1227080 h 3709642"/>
-              <a:gd name="connsiteX26" fmla="*/ 218488 w 559472"/>
-              <a:gd name="connsiteY26" fmla="*/ 1106065 h 3709642"/>
-              <a:gd name="connsiteX27" fmla="*/ 198221 w 559472"/>
-              <a:gd name="connsiteY27" fmla="*/ 982940 h 3709642"/>
-              <a:gd name="connsiteX28" fmla="*/ 177152 w 559472"/>
-              <a:gd name="connsiteY28" fmla="*/ 858755 h 3709642"/>
-              <a:gd name="connsiteX29" fmla="*/ 155551 w 559472"/>
-              <a:gd name="connsiteY29" fmla="*/ 736861 h 3709642"/>
-              <a:gd name="connsiteX30" fmla="*/ 131782 w 559472"/>
-              <a:gd name="connsiteY30" fmla="*/ 613645 h 3709642"/>
-              <a:gd name="connsiteX31" fmla="*/ 107123 w 559472"/>
-              <a:gd name="connsiteY31" fmla="*/ 490500 h 3709642"/>
-              <a:gd name="connsiteX32" fmla="*/ 82552 w 559472"/>
-              <a:gd name="connsiteY32" fmla="*/ 367348 h 3709642"/>
-              <a:gd name="connsiteX33" fmla="*/ 55608 w 559472"/>
-              <a:gd name="connsiteY33" fmla="*/ 244762 h 3709642"/>
-              <a:gd name="connsiteX34" fmla="*/ 28130 w 559472"/>
-              <a:gd name="connsiteY34" fmla="*/ 122220 h 3709642"/>
-              <a:gd name="connsiteX35" fmla="*/ 0 w 559472"/>
-              <a:gd name="connsiteY35" fmla="*/ 0 h 3709642"/>
-            </a:gdLst>
-            <a:ahLst/>
-            <a:cxnLst>
-              <a:cxn ang="0">
-                <a:pos x="connsiteX0" y="connsiteY0"/>
-              </a:cxn>
-              <a:cxn ang="0">
-                <a:pos x="connsiteX1" y="connsiteY1"/>
-              </a:cxn>
-              <a:cxn ang="0">
-                <a:pos x="connsiteX2" y="connsiteY2"/>
-              </a:cxn>
-              <a:cxn ang="0">
-                <a:pos x="connsiteX3" y="connsiteY3"/>
-              </a:cxn>
-              <a:cxn ang="0">
-                <a:pos x="connsiteX4" y="connsiteY4"/>
-              </a:cxn>
-              <a:cxn ang="0">
-                <a:pos x="connsiteX5" y="connsiteY5"/>
-              </a:cxn>
-              <a:cxn ang="0">
-                <a:pos x="connsiteX6" y="connsiteY6"/>
-              </a:cxn>
-              <a:cxn ang="0">
-                <a:pos x="connsiteX7" y="connsiteY7"/>
-              </a:cxn>
-              <a:cxn ang="0">
-                <a:pos x="connsiteX8" y="connsiteY8"/>
-              </a:cxn>
-              <a:cxn ang="0">
-                <a:pos x="connsiteX9" y="connsiteY9"/>
-              </a:cxn>
-              <a:cxn ang="0">
-                <a:pos x="connsiteX10" y="connsiteY10"/>
-              </a:cxn>
-              <a:cxn ang="0">
-                <a:pos x="connsiteX11" y="connsiteY11"/>
-              </a:cxn>
-              <a:cxn ang="0">
-                <a:pos x="connsiteX12" y="connsiteY12"/>
-              </a:cxn>
-              <a:cxn ang="0">
-                <a:pos x="connsiteX13" y="connsiteY13"/>
-              </a:cxn>
-              <a:cxn ang="0">
-                <a:pos x="connsiteX14" y="connsiteY14"/>
-              </a:cxn>
-              <a:cxn ang="0">
-                <a:pos x="connsiteX15" y="connsiteY15"/>
-              </a:cxn>
-              <a:cxn ang="0">
-                <a:pos x="connsiteX16" y="connsiteY16"/>
-              </a:cxn>
-              <a:cxn ang="0">
-                <a:pos x="connsiteX17" y="connsiteY17"/>
-              </a:cxn>
-              <a:cxn ang="0">
-                <a:pos x="connsiteX18" y="connsiteY18"/>
-              </a:cxn>
-              <a:cxn ang="0">
-                <a:pos x="connsiteX19" y="connsiteY19"/>
-              </a:cxn>
-              <a:cxn ang="0">
-                <a:pos x="connsiteX20" y="connsiteY20"/>
-              </a:cxn>
-              <a:cxn ang="0">
-                <a:pos x="connsiteX21" y="connsiteY21"/>
-              </a:cxn>
-              <a:cxn ang="0">
-                <a:pos x="connsiteX22" y="connsiteY22"/>
-              </a:cxn>
-              <a:cxn ang="0">
-                <a:pos x="connsiteX23" y="connsiteY23"/>
-              </a:cxn>
-              <a:cxn ang="0">
-                <a:pos x="connsiteX24" y="connsiteY24"/>
-              </a:cxn>
-              <a:cxn ang="0">
-                <a:pos x="connsiteX25" y="connsiteY25"/>
-              </a:cxn>
-              <a:cxn ang="0">
-                <a:pos x="connsiteX26" y="connsiteY26"/>
-              </a:cxn>
-              <a:cxn ang="0">
-                <a:pos x="connsiteX27" y="connsiteY27"/>
-              </a:cxn>
-              <a:cxn ang="0">
-                <a:pos x="connsiteX28" y="connsiteY28"/>
-              </a:cxn>
-              <a:cxn ang="0">
-                <a:pos x="connsiteX29" y="connsiteY29"/>
-              </a:cxn>
-              <a:cxn ang="0">
-                <a:pos x="connsiteX30" y="connsiteY30"/>
-              </a:cxn>
-              <a:cxn ang="0">
-                <a:pos x="connsiteX31" y="connsiteY31"/>
-              </a:cxn>
-              <a:cxn ang="0">
-                <a:pos x="connsiteX32" y="connsiteY32"/>
-              </a:cxn>
-              <a:cxn ang="0">
-                <a:pos x="connsiteX33" y="connsiteY33"/>
-              </a:cxn>
-              <a:cxn ang="0">
-                <a:pos x="connsiteX34" y="connsiteY34"/>
-              </a:cxn>
-              <a:cxn ang="0">
-                <a:pos x="connsiteX35" y="connsiteY35"/>
-              </a:cxn>
-            </a:cxnLst>
-            <a:rect l="l" t="t" r="r" b="b"/>
-            <a:pathLst>
-              <a:path w="559472" h="3709642">
-                <a:moveTo>
-                  <a:pt x="0" y="0"/>
-                </a:moveTo>
-                <a:lnTo>
-                  <a:pt x="473952" y="0"/>
-                </a:lnTo>
-                <a:lnTo>
-                  <a:pt x="485840" y="161194"/>
-                </a:lnTo>
-                <a:cubicBezTo>
-                  <a:pt x="552063" y="1147770"/>
-                  <a:pt x="592441" y="3086737"/>
-                  <a:pt x="523949" y="3672197"/>
-                </a:cubicBezTo>
-                <a:cubicBezTo>
-                  <a:pt x="500842" y="3684557"/>
-                  <a:pt x="477855" y="3697282"/>
-                  <a:pt x="454748" y="3709642"/>
-                </a:cubicBezTo>
-                <a:lnTo>
-                  <a:pt x="448224" y="3510471"/>
-                </a:lnTo>
-                <a:lnTo>
-                  <a:pt x="443564" y="3408563"/>
-                </a:lnTo>
-                <a:lnTo>
-                  <a:pt x="438902" y="3304407"/>
-                </a:lnTo>
-                <a:lnTo>
-                  <a:pt x="433941" y="3198777"/>
-                </a:lnTo>
-                <a:lnTo>
-                  <a:pt x="427584" y="3092510"/>
-                </a:lnTo>
-                <a:lnTo>
-                  <a:pt x="420988" y="2984390"/>
-                </a:lnTo>
-                <a:lnTo>
-                  <a:pt x="414330" y="2874401"/>
-                </a:lnTo>
-                <a:lnTo>
-                  <a:pt x="406840" y="2762980"/>
-                </a:lnTo>
-                <a:lnTo>
-                  <a:pt x="397745" y="2650566"/>
-                </a:lnTo>
-                <a:lnTo>
-                  <a:pt x="389154" y="2536612"/>
-                </a:lnTo>
-                <a:lnTo>
-                  <a:pt x="379225" y="2421642"/>
-                </a:lnTo>
-                <a:lnTo>
-                  <a:pt x="368316" y="2305627"/>
-                </a:lnTo>
-                <a:lnTo>
-                  <a:pt x="357466" y="2189233"/>
-                </a:lnTo>
-                <a:lnTo>
-                  <a:pt x="344982" y="2071473"/>
-                </a:lnTo>
-                <a:lnTo>
-                  <a:pt x="332466" y="1952216"/>
-                </a:lnTo>
-                <a:lnTo>
-                  <a:pt x="319121" y="1833776"/>
-                </a:lnTo>
-                <a:lnTo>
-                  <a:pt x="304408" y="1713948"/>
-                </a:lnTo>
-                <a:lnTo>
-                  <a:pt x="288685" y="1592703"/>
-                </a:lnTo>
-                <a:lnTo>
-                  <a:pt x="273050" y="1471451"/>
-                </a:lnTo>
-                <a:lnTo>
-                  <a:pt x="255813" y="1350328"/>
-                </a:lnTo>
-                <a:lnTo>
-                  <a:pt x="237060" y="1227080"/>
-                </a:lnTo>
-                <a:lnTo>
-                  <a:pt x="218488" y="1106065"/>
-                </a:lnTo>
-                <a:lnTo>
-                  <a:pt x="198221" y="982940"/>
-                </a:lnTo>
-                <a:lnTo>
-                  <a:pt x="177152" y="858755"/>
-                </a:lnTo>
-                <a:lnTo>
-                  <a:pt x="155551" y="736861"/>
-                </a:lnTo>
-                <a:lnTo>
-                  <a:pt x="131782" y="613645"/>
-                </a:lnTo>
-                <a:lnTo>
-                  <a:pt x="107123" y="490500"/>
-                </a:lnTo>
-                <a:lnTo>
-                  <a:pt x="82552" y="367348"/>
-                </a:lnTo>
-                <a:lnTo>
-                  <a:pt x="55608" y="244762"/>
-                </a:lnTo>
-                <a:lnTo>
-                  <a:pt x="28130" y="122220"/>
-                </a:lnTo>
-                <a:lnTo>
-                  <a:pt x="0" y="0"/>
-                </a:lnTo>
-                <a:close/>
-              </a:path>
-            </a:pathLst>
-          </a:custGeom>
-          <a:solidFill>
-            <a:schemeClr val="bg1">
-              <a:alpha val="20000"/>
-            </a:schemeClr>
-          </a:solidFill>
-          <a:ln>
-            <a:noFill/>
-          </a:ln>
-        </p:spPr>
-        <p:txBody>
-          <a:bodyPr rtlCol="0" anchor="ctr"/>
-          <a:lstStyle/>
-          <a:p>
-            <a:pPr algn="ctr"/>
-            <a:endParaRPr lang="en-US"/>
-          </a:p>
-        </p:txBody>
-      </p:sp>
-      <p:sp useBgFill="1">
-        <p:nvSpPr>
-          <p:cNvPr id="26" name="Freeform: Shape 25">
-            <a:extLst>
-              <a:ext uri="{FF2B5EF4-FFF2-40B4-BE49-F238E27FC236}">
-                <a16:creationId xmlns:a16="http://schemas.microsoft.com/office/drawing/2014/main" id="{608F427C-1EC9-4280-9367-F2B3AA063E82}"/>
-              </a:ext>
-              <a:ext uri="{C183D7F6-B498-43B3-948B-1728B52AA6E4}">
-                <adec:decorative xmlns:adec="http://schemas.microsoft.com/office/drawing/2017/decorative" val="1"/>
-              </a:ext>
-            </a:extLst>
-          </p:cNvPr>
-          <p:cNvSpPr>
-            <a:spLocks noGrp="1" noRot="1" noChangeAspect="1" noMove="1" noResize="1" noEditPoints="1" noAdjustHandles="1" noChangeArrowheads="1" noChangeShapeType="1" noTextEdit="1"/>
-          </p:cNvSpPr>
-          <p:nvPr>
-            <p:extLst>
-              <p:ext uri="{386F3935-93C4-4BCD-93E2-E3B085C9AB24}">
-                <p16:designElem xmlns:p16="http://schemas.microsoft.com/office/powerpoint/2015/main" val="1"/>
-              </p:ext>
-            </p:extLst>
-          </p:nvPr>
-        </p:nvSpPr>
-        <p:spPr>
-          <a:xfrm>
-            <a:off x="0" y="0"/>
-            <a:ext cx="7809954" cy="6858000"/>
-          </a:xfrm>
-          <a:custGeom>
-            <a:avLst/>
-            <a:gdLst>
-              <a:gd name="connsiteX0" fmla="*/ 6465239 w 7809954"/>
-              <a:gd name="connsiteY0" fmla="*/ 0 h 6858000"/>
-              <a:gd name="connsiteX1" fmla="*/ 7808777 w 7809954"/>
-              <a:gd name="connsiteY1" fmla="*/ 0 h 6858000"/>
-              <a:gd name="connsiteX2" fmla="*/ 7783732 w 7809954"/>
-              <a:gd name="connsiteY2" fmla="*/ 155676 h 6858000"/>
-              <a:gd name="connsiteX3" fmla="*/ 7759863 w 7809954"/>
-              <a:gd name="connsiteY3" fmla="*/ 310667 h 6858000"/>
-              <a:gd name="connsiteX4" fmla="*/ 7736499 w 7809954"/>
-              <a:gd name="connsiteY4" fmla="*/ 466344 h 6858000"/>
-              <a:gd name="connsiteX5" fmla="*/ 7716496 w 7809954"/>
-              <a:gd name="connsiteY5" fmla="*/ 622706 h 6858000"/>
-              <a:gd name="connsiteX6" fmla="*/ 7696325 w 7809954"/>
-              <a:gd name="connsiteY6" fmla="*/ 778383 h 6858000"/>
-              <a:gd name="connsiteX7" fmla="*/ 7677499 w 7809954"/>
-              <a:gd name="connsiteY7" fmla="*/ 934745 h 6858000"/>
-              <a:gd name="connsiteX8" fmla="*/ 7661363 w 7809954"/>
-              <a:gd name="connsiteY8" fmla="*/ 1089050 h 6858000"/>
-              <a:gd name="connsiteX9" fmla="*/ 7646067 w 7809954"/>
-              <a:gd name="connsiteY9" fmla="*/ 1245413 h 6858000"/>
-              <a:gd name="connsiteX10" fmla="*/ 7632115 w 7809954"/>
-              <a:gd name="connsiteY10" fmla="*/ 1401089 h 6858000"/>
-              <a:gd name="connsiteX11" fmla="*/ 7620013 w 7809954"/>
-              <a:gd name="connsiteY11" fmla="*/ 1554023 h 6858000"/>
-              <a:gd name="connsiteX12" fmla="*/ 7607910 w 7809954"/>
-              <a:gd name="connsiteY12" fmla="*/ 1709013 h 6858000"/>
-              <a:gd name="connsiteX13" fmla="*/ 7597825 w 7809954"/>
-              <a:gd name="connsiteY13" fmla="*/ 1861947 h 6858000"/>
-              <a:gd name="connsiteX14" fmla="*/ 7589925 w 7809954"/>
-              <a:gd name="connsiteY14" fmla="*/ 2014880 h 6858000"/>
-              <a:gd name="connsiteX15" fmla="*/ 7581688 w 7809954"/>
-              <a:gd name="connsiteY15" fmla="*/ 2167128 h 6858000"/>
-              <a:gd name="connsiteX16" fmla="*/ 7574797 w 7809954"/>
-              <a:gd name="connsiteY16" fmla="*/ 2318004 h 6858000"/>
-              <a:gd name="connsiteX17" fmla="*/ 7569922 w 7809954"/>
-              <a:gd name="connsiteY17" fmla="*/ 2467508 h 6858000"/>
-              <a:gd name="connsiteX18" fmla="*/ 7565720 w 7809954"/>
-              <a:gd name="connsiteY18" fmla="*/ 2617013 h 6858000"/>
-              <a:gd name="connsiteX19" fmla="*/ 7561686 w 7809954"/>
-              <a:gd name="connsiteY19" fmla="*/ 2765145 h 6858000"/>
-              <a:gd name="connsiteX20" fmla="*/ 7559837 w 7809954"/>
-              <a:gd name="connsiteY20" fmla="*/ 2911221 h 6858000"/>
-              <a:gd name="connsiteX21" fmla="*/ 7557820 w 7809954"/>
-              <a:gd name="connsiteY21" fmla="*/ 3057296 h 6858000"/>
-              <a:gd name="connsiteX22" fmla="*/ 7556811 w 7809954"/>
-              <a:gd name="connsiteY22" fmla="*/ 3201314 h 6858000"/>
-              <a:gd name="connsiteX23" fmla="*/ 7557820 w 7809954"/>
-              <a:gd name="connsiteY23" fmla="*/ 3343960 h 6858000"/>
-              <a:gd name="connsiteX24" fmla="*/ 7557820 w 7809954"/>
-              <a:gd name="connsiteY24" fmla="*/ 3485235 h 6858000"/>
-              <a:gd name="connsiteX25" fmla="*/ 7559837 w 7809954"/>
-              <a:gd name="connsiteY25" fmla="*/ 3625138 h 6858000"/>
-              <a:gd name="connsiteX26" fmla="*/ 7562862 w 7809954"/>
-              <a:gd name="connsiteY26" fmla="*/ 3762298 h 6858000"/>
-              <a:gd name="connsiteX27" fmla="*/ 7565720 w 7809954"/>
-              <a:gd name="connsiteY27" fmla="*/ 3898087 h 6858000"/>
-              <a:gd name="connsiteX28" fmla="*/ 7568914 w 7809954"/>
-              <a:gd name="connsiteY28" fmla="*/ 4031132 h 6858000"/>
-              <a:gd name="connsiteX29" fmla="*/ 7573788 w 7809954"/>
-              <a:gd name="connsiteY29" fmla="*/ 4163491 h 6858000"/>
-              <a:gd name="connsiteX30" fmla="*/ 7578999 w 7809954"/>
-              <a:gd name="connsiteY30" fmla="*/ 4293793 h 6858000"/>
-              <a:gd name="connsiteX31" fmla="*/ 7583705 w 7809954"/>
-              <a:gd name="connsiteY31" fmla="*/ 4421352 h 6858000"/>
-              <a:gd name="connsiteX32" fmla="*/ 7596985 w 7809954"/>
-              <a:gd name="connsiteY32" fmla="*/ 4670298 h 6858000"/>
-              <a:gd name="connsiteX33" fmla="*/ 7611104 w 7809954"/>
-              <a:gd name="connsiteY33" fmla="*/ 4908956 h 6858000"/>
-              <a:gd name="connsiteX34" fmla="*/ 7625896 w 7809954"/>
-              <a:gd name="connsiteY34" fmla="*/ 5138013 h 6858000"/>
-              <a:gd name="connsiteX35" fmla="*/ 7642201 w 7809954"/>
-              <a:gd name="connsiteY35" fmla="*/ 5354726 h 6858000"/>
-              <a:gd name="connsiteX36" fmla="*/ 7659178 w 7809954"/>
-              <a:gd name="connsiteY36" fmla="*/ 5561838 h 6858000"/>
-              <a:gd name="connsiteX37" fmla="*/ 7677499 w 7809954"/>
-              <a:gd name="connsiteY37" fmla="*/ 5753862 h 6858000"/>
-              <a:gd name="connsiteX38" fmla="*/ 7695485 w 7809954"/>
-              <a:gd name="connsiteY38" fmla="*/ 5934227 h 6858000"/>
-              <a:gd name="connsiteX39" fmla="*/ 7713470 w 7809954"/>
-              <a:gd name="connsiteY39" fmla="*/ 6100191 h 6858000"/>
-              <a:gd name="connsiteX40" fmla="*/ 7730447 w 7809954"/>
-              <a:gd name="connsiteY40" fmla="*/ 6252438 h 6858000"/>
-              <a:gd name="connsiteX41" fmla="*/ 7746584 w 7809954"/>
-              <a:gd name="connsiteY41" fmla="*/ 6387541 h 6858000"/>
-              <a:gd name="connsiteX42" fmla="*/ 7761880 w 7809954"/>
-              <a:gd name="connsiteY42" fmla="*/ 6509613 h 6858000"/>
-              <a:gd name="connsiteX43" fmla="*/ 7774655 w 7809954"/>
-              <a:gd name="connsiteY43" fmla="*/ 6612483 h 6858000"/>
-              <a:gd name="connsiteX44" fmla="*/ 7786757 w 7809954"/>
-              <a:gd name="connsiteY44" fmla="*/ 6698894 h 6858000"/>
-              <a:gd name="connsiteX45" fmla="*/ 7804071 w 7809954"/>
-              <a:gd name="connsiteY45" fmla="*/ 6817538 h 6858000"/>
-              <a:gd name="connsiteX46" fmla="*/ 7809954 w 7809954"/>
-              <a:gd name="connsiteY46" fmla="*/ 6858000 h 6858000"/>
-              <a:gd name="connsiteX47" fmla="*/ 7157124 w 7809954"/>
-              <a:gd name="connsiteY47" fmla="*/ 6858000 h 6858000"/>
-              <a:gd name="connsiteX48" fmla="*/ 7157124 w 7809954"/>
-              <a:gd name="connsiteY48" fmla="*/ 6858000 h 6858000"/>
-              <a:gd name="connsiteX49" fmla="*/ 0 w 7809954"/>
-              <a:gd name="connsiteY49" fmla="*/ 6858000 h 6858000"/>
-              <a:gd name="connsiteX50" fmla="*/ 0 w 7809954"/>
-              <a:gd name="connsiteY50" fmla="*/ 0 h 6858000"/>
-              <a:gd name="connsiteX51" fmla="*/ 6465239 w 7809954"/>
-              <a:gd name="connsiteY51" fmla="*/ 0 h 6858000"/>
-            </a:gdLst>
-            <a:ahLst/>
-            <a:cxnLst>
-              <a:cxn ang="0">
-                <a:pos x="connsiteX0" y="connsiteY0"/>
-              </a:cxn>
-              <a:cxn ang="0">
-                <a:pos x="connsiteX1" y="connsiteY1"/>
-              </a:cxn>
-              <a:cxn ang="0">
-                <a:pos x="connsiteX2" y="connsiteY2"/>
-              </a:cxn>
-              <a:cxn ang="0">
-                <a:pos x="connsiteX3" y="connsiteY3"/>
-              </a:cxn>
-              <a:cxn ang="0">
-                <a:pos x="connsiteX4" y="connsiteY4"/>
-              </a:cxn>
-              <a:cxn ang="0">
-                <a:pos x="connsiteX5" y="connsiteY5"/>
-              </a:cxn>
-              <a:cxn ang="0">
-                <a:pos x="connsiteX6" y="connsiteY6"/>
-              </a:cxn>
-              <a:cxn ang="0">
-                <a:pos x="connsiteX7" y="connsiteY7"/>
-              </a:cxn>
-              <a:cxn ang="0">
-                <a:pos x="connsiteX8" y="connsiteY8"/>
-              </a:cxn>
-              <a:cxn ang="0">
-                <a:pos x="connsiteX9" y="connsiteY9"/>
-              </a:cxn>
-              <a:cxn ang="0">
-                <a:pos x="connsiteX10" y="connsiteY10"/>
-              </a:cxn>
-              <a:cxn ang="0">
-                <a:pos x="connsiteX11" y="connsiteY11"/>
-              </a:cxn>
-              <a:cxn ang="0">
-                <a:pos x="connsiteX12" y="connsiteY12"/>
-              </a:cxn>
-              <a:cxn ang="0">
-                <a:pos x="connsiteX13" y="connsiteY13"/>
-              </a:cxn>
-              <a:cxn ang="0">
-                <a:pos x="connsiteX14" y="connsiteY14"/>
-              </a:cxn>
-              <a:cxn ang="0">
-                <a:pos x="connsiteX15" y="connsiteY15"/>
-              </a:cxn>
-              <a:cxn ang="0">
-                <a:pos x="connsiteX16" y="connsiteY16"/>
-              </a:cxn>
-              <a:cxn ang="0">
-                <a:pos x="connsiteX17" y="connsiteY17"/>
-              </a:cxn>
-              <a:cxn ang="0">
-                <a:pos x="connsiteX18" y="connsiteY18"/>
-              </a:cxn>
-              <a:cxn ang="0">
-                <a:pos x="connsiteX19" y="connsiteY19"/>
-              </a:cxn>
-              <a:cxn ang="0">
-                <a:pos x="connsiteX20" y="connsiteY20"/>
-              </a:cxn>
-              <a:cxn ang="0">
-                <a:pos x="connsiteX21" y="connsiteY21"/>
-              </a:cxn>
-              <a:cxn ang="0">
-                <a:pos x="connsiteX22" y="connsiteY22"/>
-              </a:cxn>
-              <a:cxn ang="0">
-                <a:pos x="connsiteX23" y="connsiteY23"/>
-              </a:cxn>
-              <a:cxn ang="0">
-                <a:pos x="connsiteX24" y="connsiteY24"/>
-              </a:cxn>
-              <a:cxn ang="0">
-                <a:pos x="connsiteX25" y="connsiteY25"/>
-              </a:cxn>
-              <a:cxn ang="0">
-                <a:pos x="connsiteX26" y="connsiteY26"/>
-              </a:cxn>
-              <a:cxn ang="0">
-                <a:pos x="connsiteX27" y="connsiteY27"/>
-              </a:cxn>
-              <a:cxn ang="0">
-                <a:pos x="connsiteX28" y="connsiteY28"/>
-              </a:cxn>
-              <a:cxn ang="0">
-                <a:pos x="connsiteX29" y="connsiteY29"/>
-              </a:cxn>
-              <a:cxn ang="0">
-                <a:pos x="connsiteX30" y="connsiteY30"/>
-              </a:cxn>
-              <a:cxn ang="0">
-                <a:pos x="connsiteX31" y="connsiteY31"/>
-              </a:cxn>
-              <a:cxn ang="0">
-                <a:pos x="connsiteX32" y="connsiteY32"/>
-              </a:cxn>
-              <a:cxn ang="0">
-                <a:pos x="connsiteX33" y="connsiteY33"/>
-              </a:cxn>
-              <a:cxn ang="0">
-                <a:pos x="connsiteX34" y="connsiteY34"/>
-              </a:cxn>
-              <a:cxn ang="0">
-                <a:pos x="connsiteX35" y="connsiteY35"/>
-              </a:cxn>
-              <a:cxn ang="0">
-                <a:pos x="connsiteX36" y="connsiteY36"/>
-              </a:cxn>
-              <a:cxn ang="0">
-                <a:pos x="connsiteX37" y="connsiteY37"/>
-              </a:cxn>
-              <a:cxn ang="0">
-                <a:pos x="connsiteX38" y="connsiteY38"/>
-              </a:cxn>
-              <a:cxn ang="0">
-                <a:pos x="connsiteX39" y="connsiteY39"/>
-              </a:cxn>
-              <a:cxn ang="0">
-                <a:pos x="connsiteX40" y="connsiteY40"/>
-              </a:cxn>
-              <a:cxn ang="0">
-                <a:pos x="connsiteX41" y="connsiteY41"/>
-              </a:cxn>
-              <a:cxn ang="0">
-                <a:pos x="connsiteX42" y="connsiteY42"/>
-              </a:cxn>
-              <a:cxn ang="0">
-                <a:pos x="connsiteX43" y="connsiteY43"/>
-              </a:cxn>
-              <a:cxn ang="0">
-                <a:pos x="connsiteX44" y="connsiteY44"/>
-              </a:cxn>
-              <a:cxn ang="0">
-                <a:pos x="connsiteX45" y="connsiteY45"/>
-              </a:cxn>
-              <a:cxn ang="0">
-                <a:pos x="connsiteX46" y="connsiteY46"/>
-              </a:cxn>
-              <a:cxn ang="0">
-                <a:pos x="connsiteX47" y="connsiteY47"/>
-              </a:cxn>
-              <a:cxn ang="0">
-                <a:pos x="connsiteX48" y="connsiteY48"/>
-              </a:cxn>
-              <a:cxn ang="0">
-                <a:pos x="connsiteX49" y="connsiteY49"/>
-              </a:cxn>
-              <a:cxn ang="0">
-                <a:pos x="connsiteX50" y="connsiteY50"/>
-              </a:cxn>
-              <a:cxn ang="0">
-                <a:pos x="connsiteX51" y="connsiteY51"/>
-              </a:cxn>
-            </a:cxnLst>
-            <a:rect l="l" t="t" r="r" b="b"/>
-            <a:pathLst>
-              <a:path w="7809954" h="6858000">
-                <a:moveTo>
-                  <a:pt x="6465239" y="0"/>
-                </a:moveTo>
-                <a:lnTo>
-                  <a:pt x="7808777" y="0"/>
-                </a:lnTo>
-                <a:lnTo>
-                  <a:pt x="7783732" y="155676"/>
-                </a:lnTo>
-                <a:lnTo>
-                  <a:pt x="7759863" y="310667"/>
-                </a:lnTo>
-                <a:lnTo>
-                  <a:pt x="7736499" y="466344"/>
-                </a:lnTo>
-                <a:lnTo>
-                  <a:pt x="7716496" y="622706"/>
-                </a:lnTo>
-                <a:lnTo>
-                  <a:pt x="7696325" y="778383"/>
-                </a:lnTo>
-                <a:lnTo>
-                  <a:pt x="7677499" y="934745"/>
-                </a:lnTo>
-                <a:lnTo>
-                  <a:pt x="7661363" y="1089050"/>
-                </a:lnTo>
-                <a:lnTo>
-                  <a:pt x="7646067" y="1245413"/>
-                </a:lnTo>
-                <a:lnTo>
-                  <a:pt x="7632115" y="1401089"/>
-                </a:lnTo>
-                <a:lnTo>
-                  <a:pt x="7620013" y="1554023"/>
-                </a:lnTo>
-                <a:lnTo>
-                  <a:pt x="7607910" y="1709013"/>
-                </a:lnTo>
-                <a:lnTo>
-                  <a:pt x="7597825" y="1861947"/>
-                </a:lnTo>
-                <a:lnTo>
-                  <a:pt x="7589925" y="2014880"/>
-                </a:lnTo>
-                <a:lnTo>
-                  <a:pt x="7581688" y="2167128"/>
-                </a:lnTo>
-                <a:lnTo>
-                  <a:pt x="7574797" y="2318004"/>
-                </a:lnTo>
-                <a:lnTo>
-                  <a:pt x="7569922" y="2467508"/>
-                </a:lnTo>
-                <a:lnTo>
-                  <a:pt x="7565720" y="2617013"/>
-                </a:lnTo>
-                <a:lnTo>
-                  <a:pt x="7561686" y="2765145"/>
-                </a:lnTo>
-                <a:lnTo>
-                  <a:pt x="7559837" y="2911221"/>
-                </a:lnTo>
-                <a:lnTo>
-                  <a:pt x="7557820" y="3057296"/>
-                </a:lnTo>
-                <a:lnTo>
-                  <a:pt x="7556811" y="3201314"/>
-                </a:lnTo>
-                <a:lnTo>
-                  <a:pt x="7557820" y="3343960"/>
-                </a:lnTo>
-                <a:lnTo>
-                  <a:pt x="7557820" y="3485235"/>
-                </a:lnTo>
-                <a:lnTo>
-                  <a:pt x="7559837" y="3625138"/>
-                </a:lnTo>
-                <a:lnTo>
-                  <a:pt x="7562862" y="3762298"/>
-                </a:lnTo>
-                <a:lnTo>
-                  <a:pt x="7565720" y="3898087"/>
-                </a:lnTo>
-                <a:lnTo>
-                  <a:pt x="7568914" y="4031132"/>
-                </a:lnTo>
-                <a:lnTo>
-                  <a:pt x="7573788" y="4163491"/>
-                </a:lnTo>
-                <a:lnTo>
-                  <a:pt x="7578999" y="4293793"/>
-                </a:lnTo>
-                <a:lnTo>
-                  <a:pt x="7583705" y="4421352"/>
-                </a:lnTo>
-                <a:lnTo>
-                  <a:pt x="7596985" y="4670298"/>
-                </a:lnTo>
-                <a:lnTo>
-                  <a:pt x="7611104" y="4908956"/>
-                </a:lnTo>
-                <a:lnTo>
-                  <a:pt x="7625896" y="5138013"/>
-                </a:lnTo>
-                <a:lnTo>
-                  <a:pt x="7642201" y="5354726"/>
-                </a:lnTo>
-                <a:lnTo>
-                  <a:pt x="7659178" y="5561838"/>
-                </a:lnTo>
-                <a:lnTo>
-                  <a:pt x="7677499" y="5753862"/>
-                </a:lnTo>
-                <a:lnTo>
-                  <a:pt x="7695485" y="5934227"/>
-                </a:lnTo>
-                <a:lnTo>
-                  <a:pt x="7713470" y="6100191"/>
-                </a:lnTo>
-                <a:lnTo>
-                  <a:pt x="7730447" y="6252438"/>
-                </a:lnTo>
-                <a:lnTo>
-                  <a:pt x="7746584" y="6387541"/>
-                </a:lnTo>
-                <a:lnTo>
-                  <a:pt x="7761880" y="6509613"/>
-                </a:lnTo>
-                <a:lnTo>
-                  <a:pt x="7774655" y="6612483"/>
-                </a:lnTo>
-                <a:lnTo>
-                  <a:pt x="7786757" y="6698894"/>
-                </a:lnTo>
-                <a:lnTo>
-                  <a:pt x="7804071" y="6817538"/>
-                </a:lnTo>
-                <a:lnTo>
-                  <a:pt x="7809954" y="6858000"/>
-                </a:lnTo>
-                <a:lnTo>
-                  <a:pt x="7157124" y="6858000"/>
-                </a:lnTo>
-                <a:lnTo>
-                  <a:pt x="7157124" y="6858000"/>
-                </a:lnTo>
-                <a:lnTo>
-                  <a:pt x="0" y="6858000"/>
-                </a:lnTo>
-                <a:lnTo>
-                  <a:pt x="0" y="0"/>
-                </a:lnTo>
-                <a:lnTo>
-                  <a:pt x="6465239" y="0"/>
-                </a:lnTo>
-                <a:close/>
-              </a:path>
-            </a:pathLst>
-          </a:custGeom>
-          <a:ln>
-            <a:noFill/>
-          </a:ln>
-        </p:spPr>
-        <p:style>
-          <a:lnRef idx="2">
-            <a:schemeClr val="accent1">
-              <a:shade val="50000"/>
-            </a:schemeClr>
-          </a:lnRef>
-          <a:fillRef idx="1">
-            <a:schemeClr val="accent1"/>
-          </a:fillRef>
-          <a:effectRef idx="0">
-            <a:schemeClr val="accent1"/>
-          </a:effectRef>
-          <a:fontRef idx="minor">
-            <a:schemeClr val="lt1"/>
-          </a:fontRef>
-        </p:style>
-        <p:txBody>
-          <a:bodyPr wrap="square" rtlCol="0" anchor="ctr">
-            <a:noAutofit/>
-          </a:bodyPr>
-          <a:lstStyle/>
-          <a:p>
-            <a:pPr algn="ctr"/>
-            <a:endParaRPr lang="en-US"/>
-          </a:p>
-        </p:txBody>
-      </p:sp>
-      <p:sp>
-        <p:nvSpPr>
-          <p:cNvPr id="28" name="Rectangle 27">
-            <a:extLst>
-              <a:ext uri="{FF2B5EF4-FFF2-40B4-BE49-F238E27FC236}">
-                <a16:creationId xmlns:a16="http://schemas.microsoft.com/office/drawing/2014/main" id="{F98810A7-E114-447A-A7D6-69B27CFB5650}"/>
-              </a:ext>
-              <a:ext uri="{C183D7F6-B498-43B3-948B-1728B52AA6E4}">
-                <adec:decorative xmlns:adec="http://schemas.microsoft.com/office/drawing/2017/decorative" val="1"/>
-              </a:ext>
-            </a:extLst>
-          </p:cNvPr>
-          <p:cNvSpPr>
-            <a:spLocks noGrp="1" noRot="1" noChangeAspect="1" noMove="1" noResize="1" noEditPoints="1" noAdjustHandles="1" noChangeArrowheads="1" noChangeShapeType="1" noTextEdit="1"/>
-          </p:cNvSpPr>
-          <p:nvPr>
-            <p:extLst>
-              <p:ext uri="{386F3935-93C4-4BCD-93E2-E3B085C9AB24}">
-                <p16:designElem xmlns:p16="http://schemas.microsoft.com/office/powerpoint/2015/main" val="1"/>
-              </p:ext>
-            </p:extLst>
-          </p:nvPr>
-        </p:nvSpPr>
-        <p:spPr>
-          <a:xfrm>
-            <a:off x="10437812" y="0"/>
-            <a:ext cx="685800" cy="1143000"/>
-          </a:xfrm>
-          <a:prstGeom prst="rect">
-            <a:avLst/>
-          </a:prstGeom>
-          <a:solidFill>
-            <a:schemeClr val="accent1"/>
-          </a:solidFill>
-          <a:ln>
-            <a:noFill/>
-          </a:ln>
-        </p:spPr>
-        <p:style>
-          <a:lnRef idx="1">
-            <a:schemeClr val="accent1"/>
-          </a:lnRef>
-          <a:fillRef idx="3">
-            <a:schemeClr val="accent1"/>
-          </a:fillRef>
-          <a:effectRef idx="2">
-            <a:schemeClr val="accent1"/>
-          </a:effectRef>
-          <a:fontRef idx="minor">
-            <a:schemeClr val="lt1"/>
-          </a:fontRef>
-        </p:style>
-      </p:sp>
-      <p:pic>
-        <p:nvPicPr>
-          <p:cNvPr id="5" name="Espace réservé du contenu 4" descr="Une image contenant capture d’écran&#10;&#10;Description générée automatiquement">
-            <a:extLst>
-              <a:ext uri="{FF2B5EF4-FFF2-40B4-BE49-F238E27FC236}">
-                <a16:creationId xmlns:a16="http://schemas.microsoft.com/office/drawing/2014/main" id="{A70AC23B-6549-4C92-8EDE-3B8CF4C92852}"/>
+                <a16:creationId xmlns:a16="http://schemas.microsoft.com/office/drawing/2014/main" id="{454C518A-C5A2-4640-BA3F-B3A5CE4DB812}"/>
               </a:ext>
             </a:extLst>
           </p:cNvPr>
@@ -7583,15 +6651,15 @@
           </p:nvPr>
         </p:nvPicPr>
         <p:blipFill>
-          <a:blip r:embed="rId6"/>
+          <a:blip r:embed="rId7"/>
           <a:stretch>
             <a:fillRect/>
           </a:stretch>
         </p:blipFill>
         <p:spPr>
           <a:xfrm>
-            <a:off x="955764" y="647698"/>
-            <a:ext cx="5646841" cy="5562139"/>
+            <a:off x="427607" y="511709"/>
+            <a:ext cx="6039975" cy="5949375"/>
           </a:xfrm>
           <a:prstGeom prst="rect">
             <a:avLst/>
@@ -7607,7 +6675,7 @@
     </p:extLst>
   </p:cSld>
   <p:clrMapOvr>
-    <a:overrideClrMapping bg1="lt1" tx1="dk1" bg2="lt2" tx2="dk2" accent1="accent1" accent2="accent2" accent3="accent3" accent4="accent4" accent5="accent5" accent6="accent6" hlink="hlink" folHlink="folHlink"/>
+    <a:masterClrMapping/>
   </p:clrMapOvr>
 </p:sld>
 </file>

</xml_diff>